<commit_message>
Adding video link to readme
</commit_message>
<xml_diff>
--- a/02 spfx sprest crud.pptx
+++ b/02 spfx sprest crud.pptx
@@ -284,7 +284,7 @@
               <a:rPr lang="en-US" smtClean="0">
                 <a:latin typeface="Segoe UI" pitchFamily="34" charset="0"/>
               </a:rPr>
-              <a:t>12/20/2018 9:08 PM</a:t>
+              <a:t>1/17/2019 4:18 PM</a:t>
             </a:fld>
             <a:endParaRPr lang="en-US" dirty="0">
               <a:latin typeface="Segoe UI" pitchFamily="34" charset="0"/>
@@ -581,7 +581,7 @@
           <a:p>
             <a:fld id="{D18B56EA-E28F-4F92-9F16-7A6F2501B303}" type="datetime8">
               <a:rPr lang="en-US" smtClean="0"/>
-              <a:t>12/20/2018 9:08 PM</a:t>
+              <a:t>1/17/2019 4:17 PM</a:t>
             </a:fld>
             <a:endParaRPr lang="en-US" dirty="0"/>
           </a:p>
@@ -964,7 +964,7 @@
           <a:p>
             <a:fld id="{D18B56EA-E28F-4F92-9F16-7A6F2501B303}" type="datetime8">
               <a:rPr lang="en-US" smtClean="0"/>
-              <a:t>12/20/2018 9:08 PM</a:t>
+              <a:t>1/17/2019 4:17 PM</a:t>
             </a:fld>
             <a:endParaRPr lang="en-US" dirty="0"/>
           </a:p>
@@ -1145,7 +1145,7 @@
           <a:p>
             <a:fld id="{D18B56EA-E28F-4F92-9F16-7A6F2501B303}" type="datetime8">
               <a:rPr lang="en-US" smtClean="0"/>
-              <a:t>12/20/2018 9:08 PM</a:t>
+              <a:t>1/17/2019 4:17 PM</a:t>
             </a:fld>
             <a:endParaRPr lang="en-US" dirty="0"/>
           </a:p>
@@ -1488,7 +1488,7 @@
           <a:p>
             <a:fld id="{D18B56EA-E28F-4F92-9F16-7A6F2501B303}" type="datetime8">
               <a:rPr lang="en-US" smtClean="0"/>
-              <a:t>12/20/2018 9:09 PM</a:t>
+              <a:t>1/17/2019 4:17 PM</a:t>
             </a:fld>
             <a:endParaRPr lang="en-US" dirty="0"/>
           </a:p>
@@ -1669,7 +1669,7 @@
           <a:p>
             <a:fld id="{D18B56EA-E28F-4F92-9F16-7A6F2501B303}" type="datetime8">
               <a:rPr lang="en-US" smtClean="0"/>
-              <a:t>12/20/2018 9:10 PM</a:t>
+              <a:t>1/17/2019 4:17 PM</a:t>
             </a:fld>
             <a:endParaRPr lang="en-US" dirty="0"/>
           </a:p>
@@ -1850,7 +1850,7 @@
           <a:p>
             <a:fld id="{D18B56EA-E28F-4F92-9F16-7A6F2501B303}" type="datetime8">
               <a:rPr lang="en-US" smtClean="0"/>
-              <a:t>12/20/2018 9:10 PM</a:t>
+              <a:t>1/17/2019 4:17 PM</a:t>
             </a:fld>
             <a:endParaRPr lang="en-US" dirty="0"/>
           </a:p>
@@ -2031,7 +2031,7 @@
           <a:p>
             <a:fld id="{D18B56EA-E28F-4F92-9F16-7A6F2501B303}" type="datetime8">
               <a:rPr lang="en-US" smtClean="0"/>
-              <a:t>12/20/2018 9:10 PM</a:t>
+              <a:t>1/17/2019 4:17 PM</a:t>
             </a:fld>
             <a:endParaRPr lang="en-US" dirty="0"/>
           </a:p>
@@ -16507,7 +16507,12 @@
             <p:ph type="body" sz="quarter" idx="10"/>
           </p:nvPr>
         </p:nvSpPr>
-        <p:spPr/>
+        <p:spPr>
+          <a:xfrm>
+            <a:off x="464400" y="1212850"/>
+            <a:ext cx="11574000" cy="3878369"/>
+          </a:xfrm>
+        </p:spPr>
         <p:txBody>
           <a:bodyPr/>
           <a:lstStyle/>
@@ -16563,7 +16568,11 @@
             </a:r>
             <a:r>
               <a:rPr lang="en-US" sz="2000" dirty="0"/>
-              <a:t>: specify version of the item on the server to be updated / deleted</a:t>
+              <a:t>: specify version of the item on the server to be updated </a:t>
+            </a:r>
+            <a:r>
+              <a:rPr lang="en-US" sz="2000"/>
+              <a:t>/ deleted </a:t>
             </a:r>
             <a:endParaRPr lang="en-US" sz="2000" dirty="0">
               <a:latin typeface="Courier New" panose="02070309020205020404" pitchFamily="49" charset="0"/>

</xml_diff>

<commit_message>
Fix link in Demo 2 slide deck
</commit_message>
<xml_diff>
--- a/02 spfx sprest crud.pptx
+++ b/02 spfx sprest crud.pptx
@@ -284,7 +284,7 @@
               <a:rPr lang="en-US" smtClean="0">
                 <a:latin typeface="Segoe UI" pitchFamily="34" charset="0"/>
               </a:rPr>
-              <a:t>1/17/2019 4:18 PM</a:t>
+              <a:t>3/8/2019 7:00 PM</a:t>
             </a:fld>
             <a:endParaRPr lang="en-US" dirty="0">
               <a:latin typeface="Segoe UI" pitchFamily="34" charset="0"/>
@@ -581,7 +581,7 @@
           <a:p>
             <a:fld id="{D18B56EA-E28F-4F92-9F16-7A6F2501B303}" type="datetime8">
               <a:rPr lang="en-US" smtClean="0"/>
-              <a:t>1/17/2019 4:17 PM</a:t>
+              <a:t>3/8/2019 6:58 PM</a:t>
             </a:fld>
             <a:endParaRPr lang="en-US" dirty="0"/>
           </a:p>
@@ -964,7 +964,7 @@
           <a:p>
             <a:fld id="{D18B56EA-E28F-4F92-9F16-7A6F2501B303}" type="datetime8">
               <a:rPr lang="en-US" smtClean="0"/>
-              <a:t>1/17/2019 4:17 PM</a:t>
+              <a:t>3/8/2019 6:58 PM</a:t>
             </a:fld>
             <a:endParaRPr lang="en-US" dirty="0"/>
           </a:p>
@@ -1145,7 +1145,7 @@
           <a:p>
             <a:fld id="{D18B56EA-E28F-4F92-9F16-7A6F2501B303}" type="datetime8">
               <a:rPr lang="en-US" smtClean="0"/>
-              <a:t>1/17/2019 4:17 PM</a:t>
+              <a:t>3/8/2019 6:58 PM</a:t>
             </a:fld>
             <a:endParaRPr lang="en-US" dirty="0"/>
           </a:p>
@@ -1488,7 +1488,7 @@
           <a:p>
             <a:fld id="{D18B56EA-E28F-4F92-9F16-7A6F2501B303}" type="datetime8">
               <a:rPr lang="en-US" smtClean="0"/>
-              <a:t>1/17/2019 4:17 PM</a:t>
+              <a:t>3/8/2019 6:58 PM</a:t>
             </a:fld>
             <a:endParaRPr lang="en-US" dirty="0"/>
           </a:p>
@@ -1669,7 +1669,7 @@
           <a:p>
             <a:fld id="{D18B56EA-E28F-4F92-9F16-7A6F2501B303}" type="datetime8">
               <a:rPr lang="en-US" smtClean="0"/>
-              <a:t>1/17/2019 4:17 PM</a:t>
+              <a:t>3/8/2019 6:58 PM</a:t>
             </a:fld>
             <a:endParaRPr lang="en-US" dirty="0"/>
           </a:p>
@@ -1850,7 +1850,7 @@
           <a:p>
             <a:fld id="{D18B56EA-E28F-4F92-9F16-7A6F2501B303}" type="datetime8">
               <a:rPr lang="en-US" smtClean="0"/>
-              <a:t>1/17/2019 4:17 PM</a:t>
+              <a:t>3/8/2019 6:58 PM</a:t>
             </a:fld>
             <a:endParaRPr lang="en-US" dirty="0"/>
           </a:p>
@@ -2031,7 +2031,7 @@
           <a:p>
             <a:fld id="{D18B56EA-E28F-4F92-9F16-7A6F2501B303}" type="datetime8">
               <a:rPr lang="en-US" smtClean="0"/>
-              <a:t>1/17/2019 4:17 PM</a:t>
+              <a:t>3/8/2019 6:58 PM</a:t>
             </a:fld>
             <a:endParaRPr lang="en-US" dirty="0"/>
           </a:p>
@@ -15936,7 +15936,7 @@
               <a:rPr lang="en-US" sz="1800" dirty="0">
                 <a:latin typeface="+mj-lt"/>
               </a:rPr>
-              <a:t>SharePoint Framework</a:t>
+              <a:t>Overview of the SharePoint Framework</a:t>
             </a:r>
           </a:p>
           <a:p>
@@ -15955,7 +15955,7 @@
                 <a:latin typeface="+mj-lt"/>
                 <a:hlinkClick r:id="rId3"/>
               </a:rPr>
-              <a:t>https://docs.microsoft.com/sharepoint/dev/spfx</a:t>
+              <a:t>https://docs.microsoft.com/sharepoint/dev/spfx/sharepoint-framework-overview</a:t>
             </a:r>
             <a:endParaRPr lang="en-US" sz="1800" dirty="0">
               <a:latin typeface="+mj-lt"/>

</xml_diff>